<commit_message>
VISUALIZACION: PEC2 - Finalizada
</commit_message>
<xml_diff>
--- a/2021-22/PrimerSemestre/Visualizacion/PEC2/TecnicasDeVisualizacion.pptx
+++ b/2021-22/PrimerSemestre/Visualizacion/PEC2/TecnicasDeVisualizacion.pptx
@@ -4607,7 +4607,7 @@
           <a:p>
             <a:r>
               <a:rPr lang="es-ES" dirty="0"/>
-              <a:t>Representación del gráfico de barras</a:t>
+              <a:t>Representación del gráfico de isotipo</a:t>
             </a:r>
           </a:p>
         </p:txBody>
@@ -6222,7 +6222,7 @@
           <a:p>
             <a:r>
               <a:rPr lang="es-ES" dirty="0"/>
-              <a:t>Representación del gráfico de barras</a:t>
+              <a:t>Representación del gráfico de cascada</a:t>
             </a:r>
           </a:p>
         </p:txBody>

</xml_diff>